<commit_message>
Added image to pptx.
</commit_message>
<xml_diff>
--- a/presentation/presentation.pptx
+++ b/presentation/presentation.pptx
@@ -4772,6 +4772,42 @@
           <a:xfrm>
             <a:off x="7989904" y="3769371"/>
             <a:ext cx="3363896" cy="2723504"/>
+          </a:xfrm>
+          <a:prstGeom prst="rect">
+            <a:avLst/>
+          </a:prstGeom>
+        </p:spPr>
+      </p:pic>
+      <p:pic>
+        <p:nvPicPr>
+          <p:cNvPr id="8" name="Picture 7">
+            <a:extLst>
+              <a:ext uri="{FF2B5EF4-FFF2-40B4-BE49-F238E27FC236}">
+                <a16:creationId xmlns:a16="http://schemas.microsoft.com/office/drawing/2014/main" id="{2EDCBAD2-2A75-4B22-8773-9A829BAB9507}"/>
+              </a:ext>
+            </a:extLst>
+          </p:cNvPr>
+          <p:cNvPicPr>
+            <a:picLocks noChangeAspect="1"/>
+          </p:cNvPicPr>
+          <p:nvPr/>
+        </p:nvPicPr>
+        <p:blipFill>
+          <a:blip r:embed="rId4">
+            <a:extLst>
+              <a:ext uri="{28A0092B-C50C-407E-A947-70E740481C1C}">
+                <a14:useLocalDpi xmlns:a14="http://schemas.microsoft.com/office/drawing/2010/main" val="0"/>
+              </a:ext>
+            </a:extLst>
+          </a:blip>
+          <a:stretch>
+            <a:fillRect/>
+          </a:stretch>
+        </p:blipFill>
+        <p:spPr>
+          <a:xfrm>
+            <a:off x="8983815" y="681037"/>
+            <a:ext cx="2369985" cy="2171345"/>
           </a:xfrm>
           <a:prstGeom prst="rect">
             <a:avLst/>

</xml_diff>